<commit_message>
fixes to ppt by x0Adams
</commit_message>
<xml_diff>
--- a/záróprojekt_11ESZ.pptx
+++ b/záróprojekt_11ESZ.pptx
@@ -143,12 +143,12 @@
   <pc:docChgLst>
     <pc:chgData name="Ádám Győri" userId="4d9fed6201f4995a" providerId="LiveId" clId="{BD3D67E3-0DD8-4642-B879-5A5326420380}"/>
     <pc:docChg chg="undo custSel addSld delSld modSld sldOrd addMainMaster delMainMaster modMainMaster">
-      <pc:chgData name="Ádám Győri" userId="4d9fed6201f4995a" providerId="LiveId" clId="{BD3D67E3-0DD8-4642-B879-5A5326420380}" dt="2024-06-05T10:33:32.194" v="499"/>
+      <pc:chgData name="Ádám Győri" userId="4d9fed6201f4995a" providerId="LiveId" clId="{BD3D67E3-0DD8-4642-B879-5A5326420380}" dt="2024-06-05T11:23:56.205" v="519" actId="22"/>
       <pc:docMkLst>
         <pc:docMk/>
       </pc:docMkLst>
       <pc:sldChg chg="addSp delSp modSp mod modTransition setBg modClrScheme setClrOvrMap delDesignElem chgLayout">
-        <pc:chgData name="Ádám Győri" userId="4d9fed6201f4995a" providerId="LiveId" clId="{BD3D67E3-0DD8-4642-B879-5A5326420380}" dt="2024-06-05T08:14:45.749" v="293"/>
+        <pc:chgData name="Ádám Győri" userId="4d9fed6201f4995a" providerId="LiveId" clId="{BD3D67E3-0DD8-4642-B879-5A5326420380}" dt="2024-06-05T11:20:11.618" v="515" actId="20577"/>
         <pc:sldMkLst>
           <pc:docMk/>
           <pc:sldMk cId="3319743928" sldId="256"/>
@@ -162,7 +162,7 @@
           </ac:spMkLst>
         </pc:spChg>
         <pc:spChg chg="mod">
-          <ac:chgData name="Ádám Győri" userId="4d9fed6201f4995a" providerId="LiveId" clId="{BD3D67E3-0DD8-4642-B879-5A5326420380}" dt="2024-06-05T07:15:33.406" v="88" actId="14100"/>
+          <ac:chgData name="Ádám Győri" userId="4d9fed6201f4995a" providerId="LiveId" clId="{BD3D67E3-0DD8-4642-B879-5A5326420380}" dt="2024-06-05T11:20:11.618" v="515" actId="20577"/>
           <ac:spMkLst>
             <pc:docMk/>
             <pc:sldMk cId="3319743928" sldId="256"/>
@@ -435,11 +435,19 @@
         </pc:picChg>
       </pc:sldChg>
       <pc:sldChg chg="addSp delSp add mod">
-        <pc:chgData name="Ádám Győri" userId="4d9fed6201f4995a" providerId="LiveId" clId="{BD3D67E3-0DD8-4642-B879-5A5326420380}" dt="2024-06-05T08:22:38.700" v="306" actId="22"/>
+        <pc:chgData name="Ádám Győri" userId="4d9fed6201f4995a" providerId="LiveId" clId="{BD3D67E3-0DD8-4642-B879-5A5326420380}" dt="2024-06-05T11:23:56.205" v="519" actId="22"/>
         <pc:sldMkLst>
           <pc:docMk/>
           <pc:sldMk cId="3985842382" sldId="262"/>
         </pc:sldMkLst>
+        <pc:picChg chg="add del">
+          <ac:chgData name="Ádám Győri" userId="4d9fed6201f4995a" providerId="LiveId" clId="{BD3D67E3-0DD8-4642-B879-5A5326420380}" dt="2024-06-05T11:23:54.483" v="518" actId="478"/>
+          <ac:picMkLst>
+            <pc:docMk/>
+            <pc:sldMk cId="3985842382" sldId="262"/>
+            <ac:picMk id="3" creationId="{39AF8B19-121D-1F78-519C-F706F656C029}"/>
+          </ac:picMkLst>
+        </pc:picChg>
         <pc:picChg chg="del">
           <ac:chgData name="Ádám Győri" userId="4d9fed6201f4995a" providerId="LiveId" clId="{BD3D67E3-0DD8-4642-B879-5A5326420380}" dt="2024-06-05T08:21:42.280" v="305" actId="478"/>
           <ac:picMkLst>
@@ -448,12 +456,20 @@
             <ac:picMk id="3" creationId="{A2733518-46A0-30E8-3169-0E4EBC699A0A}"/>
           </ac:picMkLst>
         </pc:picChg>
-        <pc:picChg chg="add">
-          <ac:chgData name="Ádám Győri" userId="4d9fed6201f4995a" providerId="LiveId" clId="{BD3D67E3-0DD8-4642-B879-5A5326420380}" dt="2024-06-05T08:22:38.700" v="306" actId="22"/>
+        <pc:picChg chg="add del">
+          <ac:chgData name="Ádám Győri" userId="4d9fed6201f4995a" providerId="LiveId" clId="{BD3D67E3-0DD8-4642-B879-5A5326420380}" dt="2024-06-05T11:23:29.480" v="516" actId="478"/>
           <ac:picMkLst>
             <pc:docMk/>
             <pc:sldMk cId="3985842382" sldId="262"/>
             <ac:picMk id="4" creationId="{66C8512D-6BD9-02D6-F252-92A9DEA4B5F4}"/>
+          </ac:picMkLst>
+        </pc:picChg>
+        <pc:picChg chg="add">
+          <ac:chgData name="Ádám Győri" userId="4d9fed6201f4995a" providerId="LiveId" clId="{BD3D67E3-0DD8-4642-B879-5A5326420380}" dt="2024-06-05T11:23:56.205" v="519" actId="22"/>
+          <ac:picMkLst>
+            <pc:docMk/>
+            <pc:sldMk cId="3985842382" sldId="262"/>
+            <ac:picMk id="6" creationId="{EC877021-428C-C84E-9867-A3A9E3902C45}"/>
           </ac:picMkLst>
         </pc:picChg>
       </pc:sldChg>
@@ -4639,13 +4655,18 @@
           </a:p>
           <a:p>
             <a:r>
-              <a:rPr lang="hu-HU" sz="2200" dirty="0">
+              <a:rPr lang="en-US" sz="2200" dirty="0" err="1">
                 <a:solidFill>
                   <a:srgbClr val="FFFFFF"/>
                 </a:solidFill>
               </a:rPr>
-              <a:t>Trinix025</a:t>
-            </a:r>
+              <a:t>PaPa</a:t>
+            </a:r>
+            <a:endParaRPr lang="en-US" sz="2200" dirty="0">
+              <a:solidFill>
+                <a:srgbClr val="FFFFFF"/>
+              </a:solidFill>
+            </a:endParaRPr>
           </a:p>
         </p:txBody>
       </p:sp>
@@ -5667,13 +5688,13 @@
   <p:clrMapOvr>
     <a:masterClrMapping/>
   </p:clrMapOvr>
-  <mc:AlternateContent xmlns:mc="http://schemas.openxmlformats.org/markup-compatibility/2006">
-    <mc:Choice xmlns:p159="http://schemas.microsoft.com/office/powerpoint/2015/09/main" Requires="p159">
+  <mc:AlternateContent xmlns:mc="http://schemas.openxmlformats.org/markup-compatibility/2006" xmlns:p159="http://schemas.microsoft.com/office/powerpoint/2015/09/main">
+    <mc:Choice Requires="p159">
       <p:transition>
         <p159:morph option="byObject"/>
       </p:transition>
     </mc:Choice>
-    <mc:Fallback>
+    <mc:Fallback xmlns="">
       <p:transition>
         <p:fade/>
       </p:transition>
@@ -5786,13 +5807,13 @@
   <p:clrMapOvr>
     <a:masterClrMapping/>
   </p:clrMapOvr>
-  <mc:AlternateContent xmlns:mc="http://schemas.openxmlformats.org/markup-compatibility/2006">
-    <mc:Choice xmlns:p159="http://schemas.microsoft.com/office/powerpoint/2015/09/main" Requires="p159">
+  <mc:AlternateContent xmlns:mc="http://schemas.openxmlformats.org/markup-compatibility/2006" xmlns:p159="http://schemas.microsoft.com/office/powerpoint/2015/09/main">
+    <mc:Choice Requires="p159">
       <p:transition>
         <p159:morph option="byObject"/>
       </p:transition>
     </mc:Choice>
-    <mc:Fallback>
+    <mc:Fallback xmlns="">
       <p:transition>
         <p:fade/>
       </p:transition>
@@ -6432,10 +6453,10 @@
       </p:grpSpPr>
       <p:pic>
         <p:nvPicPr>
-          <p:cNvPr id="4" name="Kép 3">
-            <a:extLst>
-              <a:ext uri="{FF2B5EF4-FFF2-40B4-BE49-F238E27FC236}">
-                <a16:creationId xmlns:a16="http://schemas.microsoft.com/office/drawing/2014/main" id="{66C8512D-6BD9-02D6-F252-92A9DEA4B5F4}"/>
+          <p:cNvPr id="6" name="Kép 5">
+            <a:extLst>
+              <a:ext uri="{FF2B5EF4-FFF2-40B4-BE49-F238E27FC236}">
+                <a16:creationId xmlns:a16="http://schemas.microsoft.com/office/drawing/2014/main" id="{EC877021-428C-C84E-9867-A3A9E3902C45}"/>
               </a:ext>
             </a:extLst>
           </p:cNvPr>
@@ -6452,8 +6473,8 @@
         </p:blipFill>
         <p:spPr>
           <a:xfrm>
-            <a:off x="1190513" y="0"/>
-            <a:ext cx="9810974" cy="6858000"/>
+            <a:off x="825222" y="0"/>
+            <a:ext cx="10541555" cy="6858000"/>
           </a:xfrm>
           <a:prstGeom prst="rect">
             <a:avLst/>

</xml_diff>